<commit_message>
Trabajo de fin de semana
</commit_message>
<xml_diff>
--- a/RIMEDIE/Mat09_2015/Assessing the Model/Reporte_Resumen_Indices_TCT_AFC_AFE_MAT09.pptx
+++ b/RIMEDIE/Mat09_2015/Assessing the Model/Reporte_Resumen_Indices_TCT_AFC_AFE_MAT09.pptx
@@ -11,6 +11,12 @@
     <p:sldId id="259" r:id="rId5"/>
     <p:sldId id="260" r:id="rId6"/>
     <p:sldId id="261" r:id="rId7"/>
+    <p:sldId id="263" r:id="rId8"/>
+    <p:sldId id="265" r:id="rId9"/>
+    <p:sldId id="264" r:id="rId10"/>
+    <p:sldId id="266" r:id="rId11"/>
+    <p:sldId id="262" r:id="rId12"/>
+    <p:sldId id="267" r:id="rId13"/>
   </p:sldIdLst>
   <p:sldSz cx="12192000" cy="6858000"/>
   <p:notesSz cx="6858000" cy="9144000"/>
@@ -111,7 +117,7 @@
   </p:defaultTextStyle>
   <p:extLst>
     <p:ext uri="{EFAFB233-063F-42B5-8137-9DF3F51BA10A}">
-      <p15:sldGuideLst xmlns:p15="http://schemas.microsoft.com/office/powerpoint/2012/main">
+      <p15:sldGuideLst xmlns:p15="http://schemas.microsoft.com/office/powerpoint/2012/main" xmlns="">
         <p15:guide id="1" orient="horz" pos="2160" userDrawn="1">
           <p15:clr>
             <a:srgbClr val="A4A3A4"/>
@@ -259,7 +265,7 @@
           <a:p>
             <a:fld id="{E07CCE1C-7E72-4E68-BAD1-C2390876B6F9}" type="datetimeFigureOut">
               <a:rPr lang="es-MX" smtClean="0"/>
-              <a:t>11/04/2019</a:t>
+              <a:t>15/04/2019</a:t>
             </a:fld>
             <a:endParaRPr lang="es-MX"/>
           </a:p>
@@ -429,7 +435,7 @@
           <a:p>
             <a:fld id="{E07CCE1C-7E72-4E68-BAD1-C2390876B6F9}" type="datetimeFigureOut">
               <a:rPr lang="es-MX" smtClean="0"/>
-              <a:t>11/04/2019</a:t>
+              <a:t>15/04/2019</a:t>
             </a:fld>
             <a:endParaRPr lang="es-MX"/>
           </a:p>
@@ -609,7 +615,7 @@
           <a:p>
             <a:fld id="{E07CCE1C-7E72-4E68-BAD1-C2390876B6F9}" type="datetimeFigureOut">
               <a:rPr lang="es-MX" smtClean="0"/>
-              <a:t>11/04/2019</a:t>
+              <a:t>15/04/2019</a:t>
             </a:fld>
             <a:endParaRPr lang="es-MX"/>
           </a:p>
@@ -779,7 +785,7 @@
           <a:p>
             <a:fld id="{E07CCE1C-7E72-4E68-BAD1-C2390876B6F9}" type="datetimeFigureOut">
               <a:rPr lang="es-MX" smtClean="0"/>
-              <a:t>11/04/2019</a:t>
+              <a:t>15/04/2019</a:t>
             </a:fld>
             <a:endParaRPr lang="es-MX"/>
           </a:p>
@@ -1025,7 +1031,7 @@
           <a:p>
             <a:fld id="{E07CCE1C-7E72-4E68-BAD1-C2390876B6F9}" type="datetimeFigureOut">
               <a:rPr lang="es-MX" smtClean="0"/>
-              <a:t>11/04/2019</a:t>
+              <a:t>15/04/2019</a:t>
             </a:fld>
             <a:endParaRPr lang="es-MX"/>
           </a:p>
@@ -1257,7 +1263,7 @@
           <a:p>
             <a:fld id="{E07CCE1C-7E72-4E68-BAD1-C2390876B6F9}" type="datetimeFigureOut">
               <a:rPr lang="es-MX" smtClean="0"/>
-              <a:t>11/04/2019</a:t>
+              <a:t>15/04/2019</a:t>
             </a:fld>
             <a:endParaRPr lang="es-MX"/>
           </a:p>
@@ -1624,7 +1630,7 @@
           <a:p>
             <a:fld id="{E07CCE1C-7E72-4E68-BAD1-C2390876B6F9}" type="datetimeFigureOut">
               <a:rPr lang="es-MX" smtClean="0"/>
-              <a:t>11/04/2019</a:t>
+              <a:t>15/04/2019</a:t>
             </a:fld>
             <a:endParaRPr lang="es-MX"/>
           </a:p>
@@ -1742,7 +1748,7 @@
           <a:p>
             <a:fld id="{E07CCE1C-7E72-4E68-BAD1-C2390876B6F9}" type="datetimeFigureOut">
               <a:rPr lang="es-MX" smtClean="0"/>
-              <a:t>11/04/2019</a:t>
+              <a:t>15/04/2019</a:t>
             </a:fld>
             <a:endParaRPr lang="es-MX"/>
           </a:p>
@@ -1837,7 +1843,7 @@
           <a:p>
             <a:fld id="{E07CCE1C-7E72-4E68-BAD1-C2390876B6F9}" type="datetimeFigureOut">
               <a:rPr lang="es-MX" smtClean="0"/>
-              <a:t>11/04/2019</a:t>
+              <a:t>15/04/2019</a:t>
             </a:fld>
             <a:endParaRPr lang="es-MX"/>
           </a:p>
@@ -2114,7 +2120,7 @@
           <a:p>
             <a:fld id="{E07CCE1C-7E72-4E68-BAD1-C2390876B6F9}" type="datetimeFigureOut">
               <a:rPr lang="es-MX" smtClean="0"/>
-              <a:t>11/04/2019</a:t>
+              <a:t>15/04/2019</a:t>
             </a:fld>
             <a:endParaRPr lang="es-MX"/>
           </a:p>
@@ -2367,7 +2373,7 @@
           <a:p>
             <a:fld id="{E07CCE1C-7E72-4E68-BAD1-C2390876B6F9}" type="datetimeFigureOut">
               <a:rPr lang="es-MX" smtClean="0"/>
-              <a:t>11/04/2019</a:t>
+              <a:t>15/04/2019</a:t>
             </a:fld>
             <a:endParaRPr lang="es-MX"/>
           </a:p>
@@ -2580,7 +2586,7 @@
           <a:p>
             <a:fld id="{E07CCE1C-7E72-4E68-BAD1-C2390876B6F9}" type="datetimeFigureOut">
               <a:rPr lang="es-MX" smtClean="0"/>
-              <a:t>11/04/2019</a:t>
+              <a:t>15/04/2019</a:t>
             </a:fld>
             <a:endParaRPr lang="es-MX"/>
           </a:p>
@@ -3124,6 +3130,880 @@
 </p:sld>
 </file>
 
+<file path=ppt/slides/slide10.xml><?xml version="1.0" encoding="utf-8"?>
+<p:sld xmlns:a="http://schemas.openxmlformats.org/drawingml/2006/main" xmlns:r="http://schemas.openxmlformats.org/officeDocument/2006/relationships" xmlns:p="http://schemas.openxmlformats.org/presentationml/2006/main">
+  <p:cSld>
+    <p:spTree>
+      <p:nvGrpSpPr>
+        <p:cNvPr id="1" name=""/>
+        <p:cNvGrpSpPr/>
+        <p:nvPr/>
+      </p:nvGrpSpPr>
+      <p:grpSpPr>
+        <a:xfrm>
+          <a:off x="0" y="0"/>
+          <a:ext cx="0" cy="0"/>
+          <a:chOff x="0" y="0"/>
+          <a:chExt cx="0" cy="0"/>
+        </a:xfrm>
+      </p:grpSpPr>
+      <p:pic>
+        <p:nvPicPr>
+          <p:cNvPr id="7" name="Picture 2"/>
+          <p:cNvPicPr>
+            <a:picLocks noChangeAspect="1" noChangeArrowheads="1"/>
+          </p:cNvPicPr>
+          <p:nvPr/>
+        </p:nvPicPr>
+        <p:blipFill>
+          <a:blip r:embed="rId2">
+            <a:extLst>
+              <a:ext uri="{28A0092B-C50C-407E-A947-70E740481C1C}">
+                <a14:useLocalDpi xmlns:a14="http://schemas.microsoft.com/office/drawing/2010/main" val="0"/>
+              </a:ext>
+            </a:extLst>
+          </a:blip>
+          <a:srcRect/>
+          <a:stretch>
+            <a:fillRect/>
+          </a:stretch>
+        </p:blipFill>
+        <p:spPr bwMode="auto">
+          <a:xfrm>
+            <a:off x="4486655" y="757364"/>
+            <a:ext cx="7384123" cy="5735510"/>
+          </a:xfrm>
+          <a:prstGeom prst="rect">
+            <a:avLst/>
+          </a:prstGeom>
+          <a:noFill/>
+          <a:ln w="9525">
+            <a:solidFill>
+              <a:schemeClr val="tx1"/>
+            </a:solidFill>
+            <a:miter lim="800000"/>
+            <a:headEnd/>
+            <a:tailEnd/>
+          </a:ln>
+          <a:effectLst/>
+          <a:extLst>
+            <a:ext uri="{909E8E84-426E-40DD-AFC4-6F175D3DCCD1}">
+              <a14:hiddenFill xmlns:a14="http://schemas.microsoft.com/office/drawing/2010/main">
+                <a:solidFill>
+                  <a:schemeClr val="accent1"/>
+                </a:solidFill>
+              </a14:hiddenFill>
+            </a:ext>
+            <a:ext uri="{AF507438-7753-43E0-B8FC-AC1667EBCBE1}">
+              <a14:hiddenEffects xmlns:a14="http://schemas.microsoft.com/office/drawing/2010/main">
+                <a:effectLst>
+                  <a:outerShdw dist="35921" dir="2700000" algn="ctr" rotWithShape="0">
+                    <a:schemeClr val="bg2"/>
+                  </a:outerShdw>
+                </a:effectLst>
+              </a14:hiddenEffects>
+            </a:ext>
+          </a:extLst>
+        </p:spPr>
+      </p:pic>
+      <p:sp>
+        <p:nvSpPr>
+          <p:cNvPr id="2" name="1 Título"/>
+          <p:cNvSpPr>
+            <a:spLocks noGrp="1"/>
+          </p:cNvSpPr>
+          <p:nvPr>
+            <p:ph type="title"/>
+          </p:nvPr>
+        </p:nvSpPr>
+        <p:spPr/>
+        <p:txBody>
+          <a:bodyPr/>
+          <a:lstStyle/>
+          <a:p>
+            <a:endParaRPr lang="es-MX" dirty="0"/>
+          </a:p>
+        </p:txBody>
+      </p:sp>
+      <p:sp>
+        <p:nvSpPr>
+          <p:cNvPr id="3" name="2 Marcador de contenido"/>
+          <p:cNvSpPr>
+            <a:spLocks noGrp="1"/>
+          </p:cNvSpPr>
+          <p:nvPr>
+            <p:ph idx="1"/>
+          </p:nvPr>
+        </p:nvSpPr>
+        <p:spPr>
+          <a:xfrm>
+            <a:off x="691896" y="1886585"/>
+            <a:ext cx="10515600" cy="4351338"/>
+          </a:xfrm>
+        </p:spPr>
+        <p:txBody>
+          <a:bodyPr/>
+          <a:lstStyle/>
+          <a:p>
+            <a:endParaRPr lang="es-MX" dirty="0"/>
+          </a:p>
+        </p:txBody>
+      </p:sp>
+      <p:sp>
+        <p:nvSpPr>
+          <p:cNvPr id="4" name="Rectángulo 5"/>
+          <p:cNvSpPr/>
+          <p:nvPr/>
+        </p:nvSpPr>
+        <p:spPr>
+          <a:xfrm>
+            <a:off x="0" y="-1"/>
+            <a:ext cx="12192000" cy="365125"/>
+          </a:xfrm>
+          <a:prstGeom prst="rect">
+            <a:avLst/>
+          </a:prstGeom>
+          <a:solidFill>
+            <a:schemeClr val="accent5">
+              <a:lumMod val="40000"/>
+              <a:lumOff val="60000"/>
+            </a:schemeClr>
+          </a:solidFill>
+          <a:ln>
+            <a:solidFill>
+              <a:schemeClr val="accent1"/>
+            </a:solidFill>
+          </a:ln>
+        </p:spPr>
+        <p:style>
+          <a:lnRef idx="2">
+            <a:schemeClr val="accent1">
+              <a:shade val="50000"/>
+            </a:schemeClr>
+          </a:lnRef>
+          <a:fillRef idx="1">
+            <a:schemeClr val="accent1"/>
+          </a:fillRef>
+          <a:effectRef idx="0">
+            <a:schemeClr val="accent1"/>
+          </a:effectRef>
+          <a:fontRef idx="minor">
+            <a:schemeClr val="lt1"/>
+          </a:fontRef>
+        </p:style>
+        <p:txBody>
+          <a:bodyPr rtlCol="0" anchor="ctr"/>
+          <a:lstStyle/>
+          <a:p>
+            <a:pPr algn="ctr"/>
+            <a:endParaRPr lang="es-MX"/>
+          </a:p>
+        </p:txBody>
+      </p:sp>
+      <p:sp>
+        <p:nvSpPr>
+          <p:cNvPr id="5" name="Rectángulo 6"/>
+          <p:cNvSpPr/>
+          <p:nvPr/>
+        </p:nvSpPr>
+        <p:spPr>
+          <a:xfrm>
+            <a:off x="0" y="6492874"/>
+            <a:ext cx="12192000" cy="365125"/>
+          </a:xfrm>
+          <a:prstGeom prst="rect">
+            <a:avLst/>
+          </a:prstGeom>
+          <a:solidFill>
+            <a:schemeClr val="accent5">
+              <a:lumMod val="40000"/>
+              <a:lumOff val="60000"/>
+            </a:schemeClr>
+          </a:solidFill>
+          <a:ln>
+            <a:solidFill>
+              <a:schemeClr val="accent1"/>
+            </a:solidFill>
+          </a:ln>
+        </p:spPr>
+        <p:style>
+          <a:lnRef idx="2">
+            <a:schemeClr val="accent1">
+              <a:shade val="50000"/>
+            </a:schemeClr>
+          </a:lnRef>
+          <a:fillRef idx="1">
+            <a:schemeClr val="accent1"/>
+          </a:fillRef>
+          <a:effectRef idx="0">
+            <a:schemeClr val="accent1"/>
+          </a:effectRef>
+          <a:fontRef idx="minor">
+            <a:schemeClr val="lt1"/>
+          </a:fontRef>
+        </p:style>
+        <p:txBody>
+          <a:bodyPr rtlCol="0" anchor="ctr"/>
+          <a:lstStyle/>
+          <a:p>
+            <a:pPr algn="ctr"/>
+            <a:endParaRPr lang="es-MX"/>
+          </a:p>
+        </p:txBody>
+      </p:sp>
+      <p:sp>
+        <p:nvSpPr>
+          <p:cNvPr id="6" name="Rectángulo 3"/>
+          <p:cNvSpPr/>
+          <p:nvPr/>
+        </p:nvSpPr>
+        <p:spPr>
+          <a:xfrm>
+            <a:off x="8900160" y="0"/>
+            <a:ext cx="3291840" cy="963168"/>
+          </a:xfrm>
+          <a:prstGeom prst="rect">
+            <a:avLst/>
+          </a:prstGeom>
+          <a:solidFill>
+            <a:schemeClr val="accent5">
+              <a:lumMod val="40000"/>
+              <a:lumOff val="60000"/>
+            </a:schemeClr>
+          </a:solidFill>
+          <a:ln>
+            <a:solidFill>
+              <a:schemeClr val="tx1"/>
+            </a:solidFill>
+          </a:ln>
+        </p:spPr>
+        <p:style>
+          <a:lnRef idx="2">
+            <a:schemeClr val="accent1">
+              <a:shade val="50000"/>
+            </a:schemeClr>
+          </a:lnRef>
+          <a:fillRef idx="1">
+            <a:schemeClr val="accent1"/>
+          </a:fillRef>
+          <a:effectRef idx="0">
+            <a:schemeClr val="accent1"/>
+          </a:effectRef>
+          <a:fontRef idx="minor">
+            <a:schemeClr val="lt1"/>
+          </a:fontRef>
+        </p:style>
+        <p:txBody>
+          <a:bodyPr rtlCol="0" anchor="ctr"/>
+          <a:lstStyle/>
+          <a:p>
+            <a:pPr algn="ctr"/>
+            <a:r>
+              <a:rPr lang="es-MX" sz="5000" b="1" dirty="0" smtClean="0"/>
+              <a:t>PA</a:t>
+            </a:r>
+            <a:endParaRPr lang="es-MX" sz="5000" b="1" dirty="0"/>
+          </a:p>
+        </p:txBody>
+      </p:sp>
+    </p:spTree>
+    <p:extLst>
+      <p:ext uri="{BB962C8B-B14F-4D97-AF65-F5344CB8AC3E}">
+        <p14:creationId xmlns:p14="http://schemas.microsoft.com/office/powerpoint/2010/main" val="537098628"/>
+      </p:ext>
+    </p:extLst>
+  </p:cSld>
+  <p:clrMapOvr>
+    <a:masterClrMapping/>
+  </p:clrMapOvr>
+</p:sld>
+</file>
+
+<file path=ppt/slides/slide11.xml><?xml version="1.0" encoding="utf-8"?>
+<p:sld xmlns:a="http://schemas.openxmlformats.org/drawingml/2006/main" xmlns:r="http://schemas.openxmlformats.org/officeDocument/2006/relationships" xmlns:p="http://schemas.openxmlformats.org/presentationml/2006/main">
+  <p:cSld>
+    <p:spTree>
+      <p:nvGrpSpPr>
+        <p:cNvPr id="1" name=""/>
+        <p:cNvGrpSpPr/>
+        <p:nvPr/>
+      </p:nvGrpSpPr>
+      <p:grpSpPr>
+        <a:xfrm>
+          <a:off x="0" y="0"/>
+          <a:ext cx="0" cy="0"/>
+          <a:chOff x="0" y="0"/>
+          <a:chExt cx="0" cy="0"/>
+        </a:xfrm>
+      </p:grpSpPr>
+      <p:sp>
+        <p:nvSpPr>
+          <p:cNvPr id="2" name="1 Título"/>
+          <p:cNvSpPr>
+            <a:spLocks noGrp="1"/>
+          </p:cNvSpPr>
+          <p:nvPr>
+            <p:ph type="title"/>
+          </p:nvPr>
+        </p:nvSpPr>
+        <p:spPr/>
+        <p:txBody>
+          <a:bodyPr/>
+          <a:lstStyle/>
+          <a:p>
+            <a:endParaRPr lang="es-MX"/>
+          </a:p>
+        </p:txBody>
+      </p:sp>
+      <p:sp>
+        <p:nvSpPr>
+          <p:cNvPr id="3" name="2 Marcador de contenido"/>
+          <p:cNvSpPr>
+            <a:spLocks noGrp="1"/>
+          </p:cNvSpPr>
+          <p:nvPr>
+            <p:ph idx="1"/>
+          </p:nvPr>
+        </p:nvSpPr>
+        <p:spPr/>
+        <p:txBody>
+          <a:bodyPr/>
+          <a:lstStyle/>
+          <a:p>
+            <a:endParaRPr lang="es-MX"/>
+          </a:p>
+        </p:txBody>
+      </p:sp>
+      <p:sp>
+        <p:nvSpPr>
+          <p:cNvPr id="5" name="Rectángulo 5"/>
+          <p:cNvSpPr/>
+          <p:nvPr/>
+        </p:nvSpPr>
+        <p:spPr>
+          <a:xfrm>
+            <a:off x="0" y="0"/>
+            <a:ext cx="12192000" cy="365125"/>
+          </a:xfrm>
+          <a:prstGeom prst="rect">
+            <a:avLst/>
+          </a:prstGeom>
+          <a:solidFill>
+            <a:schemeClr val="accent6">
+              <a:lumMod val="75000"/>
+            </a:schemeClr>
+          </a:solidFill>
+        </p:spPr>
+        <p:style>
+          <a:lnRef idx="2">
+            <a:schemeClr val="accent1">
+              <a:shade val="50000"/>
+            </a:schemeClr>
+          </a:lnRef>
+          <a:fillRef idx="1">
+            <a:schemeClr val="accent1"/>
+          </a:fillRef>
+          <a:effectRef idx="0">
+            <a:schemeClr val="accent1"/>
+          </a:effectRef>
+          <a:fontRef idx="minor">
+            <a:schemeClr val="lt1"/>
+          </a:fontRef>
+        </p:style>
+        <p:txBody>
+          <a:bodyPr rtlCol="0" anchor="ctr"/>
+          <a:lstStyle/>
+          <a:p>
+            <a:pPr algn="ctr"/>
+            <a:endParaRPr lang="es-MX"/>
+          </a:p>
+        </p:txBody>
+      </p:sp>
+      <p:sp>
+        <p:nvSpPr>
+          <p:cNvPr id="6" name="Rectángulo 6"/>
+          <p:cNvSpPr/>
+          <p:nvPr/>
+        </p:nvSpPr>
+        <p:spPr>
+          <a:xfrm>
+            <a:off x="0" y="6492875"/>
+            <a:ext cx="12192000" cy="365125"/>
+          </a:xfrm>
+          <a:prstGeom prst="rect">
+            <a:avLst/>
+          </a:prstGeom>
+          <a:solidFill>
+            <a:schemeClr val="accent6">
+              <a:lumMod val="75000"/>
+            </a:schemeClr>
+          </a:solidFill>
+        </p:spPr>
+        <p:style>
+          <a:lnRef idx="2">
+            <a:schemeClr val="accent1">
+              <a:shade val="50000"/>
+            </a:schemeClr>
+          </a:lnRef>
+          <a:fillRef idx="1">
+            <a:schemeClr val="accent1"/>
+          </a:fillRef>
+          <a:effectRef idx="0">
+            <a:schemeClr val="accent1"/>
+          </a:effectRef>
+          <a:fontRef idx="minor">
+            <a:schemeClr val="lt1"/>
+          </a:fontRef>
+        </p:style>
+        <p:txBody>
+          <a:bodyPr rtlCol="0" anchor="ctr"/>
+          <a:lstStyle/>
+          <a:p>
+            <a:pPr algn="ctr"/>
+            <a:endParaRPr lang="es-MX"/>
+          </a:p>
+        </p:txBody>
+      </p:sp>
+      <p:pic>
+        <p:nvPicPr>
+          <p:cNvPr id="1027" name="Picture 3"/>
+          <p:cNvPicPr>
+            <a:picLocks noChangeAspect="1" noChangeArrowheads="1"/>
+          </p:cNvPicPr>
+          <p:nvPr/>
+        </p:nvPicPr>
+        <p:blipFill>
+          <a:blip r:embed="rId2">
+            <a:extLst>
+              <a:ext uri="{28A0092B-C50C-407E-A947-70E740481C1C}">
+                <a14:useLocalDpi xmlns:a14="http://schemas.microsoft.com/office/drawing/2010/main" val="0"/>
+              </a:ext>
+            </a:extLst>
+          </a:blip>
+          <a:srcRect/>
+          <a:stretch>
+            <a:fillRect/>
+          </a:stretch>
+        </p:blipFill>
+        <p:spPr bwMode="auto">
+          <a:xfrm>
+            <a:off x="3405877" y="299023"/>
+            <a:ext cx="7974211" cy="6193852"/>
+          </a:xfrm>
+          <a:prstGeom prst="rect">
+            <a:avLst/>
+          </a:prstGeom>
+          <a:noFill/>
+          <a:ln>
+            <a:noFill/>
+          </a:ln>
+          <a:effectLst/>
+          <a:extLst>
+            <a:ext uri="{909E8E84-426E-40DD-AFC4-6F175D3DCCD1}">
+              <a14:hiddenFill xmlns:a14="http://schemas.microsoft.com/office/drawing/2010/main">
+                <a:solidFill>
+                  <a:schemeClr val="accent1"/>
+                </a:solidFill>
+              </a14:hiddenFill>
+            </a:ext>
+            <a:ext uri="{91240B29-F687-4F45-9708-019B960494DF}">
+              <a14:hiddenLine xmlns:a14="http://schemas.microsoft.com/office/drawing/2010/main" w="9525">
+                <a:solidFill>
+                  <a:schemeClr val="tx1"/>
+                </a:solidFill>
+                <a:miter lim="800000"/>
+                <a:headEnd/>
+                <a:tailEnd/>
+              </a14:hiddenLine>
+            </a:ext>
+            <a:ext uri="{AF507438-7753-43E0-B8FC-AC1667EBCBE1}">
+              <a14:hiddenEffects xmlns:a14="http://schemas.microsoft.com/office/drawing/2010/main">
+                <a:effectLst>
+                  <a:outerShdw dist="35921" dir="2700000" algn="ctr" rotWithShape="0">
+                    <a:schemeClr val="bg2"/>
+                  </a:outerShdw>
+                </a:effectLst>
+              </a14:hiddenEffects>
+            </a:ext>
+          </a:extLst>
+        </p:spPr>
+      </p:pic>
+      <p:sp>
+        <p:nvSpPr>
+          <p:cNvPr id="8" name="Rectángulo 5"/>
+          <p:cNvSpPr/>
+          <p:nvPr/>
+        </p:nvSpPr>
+        <p:spPr>
+          <a:xfrm>
+            <a:off x="0" y="-1"/>
+            <a:ext cx="12192000" cy="365125"/>
+          </a:xfrm>
+          <a:prstGeom prst="rect">
+            <a:avLst/>
+          </a:prstGeom>
+          <a:solidFill>
+            <a:schemeClr val="accent5">
+              <a:lumMod val="40000"/>
+              <a:lumOff val="60000"/>
+            </a:schemeClr>
+          </a:solidFill>
+          <a:ln>
+            <a:solidFill>
+              <a:schemeClr val="accent1"/>
+            </a:solidFill>
+          </a:ln>
+        </p:spPr>
+        <p:style>
+          <a:lnRef idx="2">
+            <a:schemeClr val="accent1">
+              <a:shade val="50000"/>
+            </a:schemeClr>
+          </a:lnRef>
+          <a:fillRef idx="1">
+            <a:schemeClr val="accent1"/>
+          </a:fillRef>
+          <a:effectRef idx="0">
+            <a:schemeClr val="accent1"/>
+          </a:effectRef>
+          <a:fontRef idx="minor">
+            <a:schemeClr val="lt1"/>
+          </a:fontRef>
+        </p:style>
+        <p:txBody>
+          <a:bodyPr rtlCol="0" anchor="ctr"/>
+          <a:lstStyle/>
+          <a:p>
+            <a:pPr algn="ctr"/>
+            <a:endParaRPr lang="es-MX"/>
+          </a:p>
+        </p:txBody>
+      </p:sp>
+      <p:sp>
+        <p:nvSpPr>
+          <p:cNvPr id="9" name="Rectángulo 6"/>
+          <p:cNvSpPr/>
+          <p:nvPr/>
+        </p:nvSpPr>
+        <p:spPr>
+          <a:xfrm>
+            <a:off x="0" y="6492874"/>
+            <a:ext cx="12192000" cy="365125"/>
+          </a:xfrm>
+          <a:prstGeom prst="rect">
+            <a:avLst/>
+          </a:prstGeom>
+          <a:solidFill>
+            <a:schemeClr val="accent5">
+              <a:lumMod val="40000"/>
+              <a:lumOff val="60000"/>
+            </a:schemeClr>
+          </a:solidFill>
+          <a:ln>
+            <a:solidFill>
+              <a:schemeClr val="accent1"/>
+            </a:solidFill>
+          </a:ln>
+        </p:spPr>
+        <p:style>
+          <a:lnRef idx="2">
+            <a:schemeClr val="accent1">
+              <a:shade val="50000"/>
+            </a:schemeClr>
+          </a:lnRef>
+          <a:fillRef idx="1">
+            <a:schemeClr val="accent1"/>
+          </a:fillRef>
+          <a:effectRef idx="0">
+            <a:schemeClr val="accent1"/>
+          </a:effectRef>
+          <a:fontRef idx="minor">
+            <a:schemeClr val="lt1"/>
+          </a:fontRef>
+        </p:style>
+        <p:txBody>
+          <a:bodyPr rtlCol="0" anchor="ctr"/>
+          <a:lstStyle/>
+          <a:p>
+            <a:pPr algn="ctr"/>
+            <a:endParaRPr lang="es-MX"/>
+          </a:p>
+        </p:txBody>
+      </p:sp>
+      <p:sp>
+        <p:nvSpPr>
+          <p:cNvPr id="10" name="Rectángulo 3"/>
+          <p:cNvSpPr/>
+          <p:nvPr/>
+        </p:nvSpPr>
+        <p:spPr>
+          <a:xfrm>
+            <a:off x="8900160" y="0"/>
+            <a:ext cx="3291840" cy="963168"/>
+          </a:xfrm>
+          <a:prstGeom prst="rect">
+            <a:avLst/>
+          </a:prstGeom>
+          <a:solidFill>
+            <a:schemeClr val="accent5">
+              <a:lumMod val="40000"/>
+              <a:lumOff val="60000"/>
+            </a:schemeClr>
+          </a:solidFill>
+          <a:ln>
+            <a:solidFill>
+              <a:schemeClr val="tx1"/>
+            </a:solidFill>
+          </a:ln>
+        </p:spPr>
+        <p:style>
+          <a:lnRef idx="2">
+            <a:schemeClr val="accent1">
+              <a:shade val="50000"/>
+            </a:schemeClr>
+          </a:lnRef>
+          <a:fillRef idx="1">
+            <a:schemeClr val="accent1"/>
+          </a:fillRef>
+          <a:effectRef idx="0">
+            <a:schemeClr val="accent1"/>
+          </a:effectRef>
+          <a:fontRef idx="minor">
+            <a:schemeClr val="lt1"/>
+          </a:fontRef>
+        </p:style>
+        <p:txBody>
+          <a:bodyPr rtlCol="0" anchor="ctr"/>
+          <a:lstStyle/>
+          <a:p>
+            <a:pPr algn="ctr"/>
+            <a:r>
+              <a:rPr lang="es-MX" sz="5000" b="1" dirty="0" smtClean="0"/>
+              <a:t>VSS</a:t>
+            </a:r>
+            <a:endParaRPr lang="es-MX" sz="5000" b="1" dirty="0"/>
+          </a:p>
+        </p:txBody>
+      </p:sp>
+    </p:spTree>
+    <p:extLst>
+      <p:ext uri="{BB962C8B-B14F-4D97-AF65-F5344CB8AC3E}">
+        <p14:creationId xmlns:p14="http://schemas.microsoft.com/office/powerpoint/2010/main" val="2582997543"/>
+      </p:ext>
+    </p:extLst>
+  </p:cSld>
+  <p:clrMapOvr>
+    <a:masterClrMapping/>
+  </p:clrMapOvr>
+</p:sld>
+</file>
+
+<file path=ppt/slides/slide12.xml><?xml version="1.0" encoding="utf-8"?>
+<p:sld xmlns:a="http://schemas.openxmlformats.org/drawingml/2006/main" xmlns:r="http://schemas.openxmlformats.org/officeDocument/2006/relationships" xmlns:p="http://schemas.openxmlformats.org/presentationml/2006/main">
+  <p:cSld>
+    <p:spTree>
+      <p:nvGrpSpPr>
+        <p:cNvPr id="1" name=""/>
+        <p:cNvGrpSpPr/>
+        <p:nvPr/>
+      </p:nvGrpSpPr>
+      <p:grpSpPr>
+        <a:xfrm>
+          <a:off x="0" y="0"/>
+          <a:ext cx="0" cy="0"/>
+          <a:chOff x="0" y="0"/>
+          <a:chExt cx="0" cy="0"/>
+        </a:xfrm>
+      </p:grpSpPr>
+      <p:sp>
+        <p:nvSpPr>
+          <p:cNvPr id="2" name="1 Título"/>
+          <p:cNvSpPr>
+            <a:spLocks noGrp="1"/>
+          </p:cNvSpPr>
+          <p:nvPr>
+            <p:ph type="title"/>
+          </p:nvPr>
+        </p:nvSpPr>
+        <p:spPr/>
+        <p:txBody>
+          <a:bodyPr/>
+          <a:lstStyle/>
+          <a:p>
+            <a:endParaRPr lang="es-MX"/>
+          </a:p>
+        </p:txBody>
+      </p:sp>
+      <p:sp>
+        <p:nvSpPr>
+          <p:cNvPr id="3" name="2 Marcador de contenido"/>
+          <p:cNvSpPr>
+            <a:spLocks noGrp="1"/>
+          </p:cNvSpPr>
+          <p:nvPr>
+            <p:ph idx="1"/>
+          </p:nvPr>
+        </p:nvSpPr>
+        <p:spPr/>
+        <p:txBody>
+          <a:bodyPr/>
+          <a:lstStyle/>
+          <a:p>
+            <a:endParaRPr lang="es-MX"/>
+          </a:p>
+        </p:txBody>
+      </p:sp>
+      <p:sp>
+        <p:nvSpPr>
+          <p:cNvPr id="4" name="Rectángulo 3"/>
+          <p:cNvSpPr/>
+          <p:nvPr/>
+        </p:nvSpPr>
+        <p:spPr>
+          <a:xfrm>
+            <a:off x="0" y="0"/>
+            <a:ext cx="12192000" cy="6858000"/>
+          </a:xfrm>
+          <a:prstGeom prst="rect">
+            <a:avLst/>
+          </a:prstGeom>
+          <a:solidFill>
+            <a:schemeClr val="bg1">
+              <a:lumMod val="50000"/>
+            </a:schemeClr>
+          </a:solidFill>
+          <a:ln>
+            <a:solidFill>
+              <a:schemeClr val="tx1"/>
+            </a:solidFill>
+          </a:ln>
+        </p:spPr>
+        <p:style>
+          <a:lnRef idx="2">
+            <a:schemeClr val="accent1">
+              <a:shade val="50000"/>
+            </a:schemeClr>
+          </a:lnRef>
+          <a:fillRef idx="1">
+            <a:schemeClr val="accent1"/>
+          </a:fillRef>
+          <a:effectRef idx="0">
+            <a:schemeClr val="accent1"/>
+          </a:effectRef>
+          <a:fontRef idx="minor">
+            <a:schemeClr val="lt1"/>
+          </a:fontRef>
+        </p:style>
+        <p:txBody>
+          <a:bodyPr rtlCol="0" anchor="ctr"/>
+          <a:lstStyle/>
+          <a:p>
+            <a:pPr algn="ctr"/>
+            <a:endParaRPr lang="es-MX"/>
+          </a:p>
+        </p:txBody>
+      </p:sp>
+      <p:sp>
+        <p:nvSpPr>
+          <p:cNvPr id="5" name="Título 1"/>
+          <p:cNvSpPr txBox="1">
+            <a:spLocks/>
+          </p:cNvSpPr>
+          <p:nvPr/>
+        </p:nvSpPr>
+        <p:spPr>
+          <a:xfrm>
+            <a:off x="1524000" y="1122362"/>
+            <a:ext cx="9144000" cy="3437445"/>
+          </a:xfrm>
+          <a:prstGeom prst="rect">
+            <a:avLst/>
+          </a:prstGeom>
+        </p:spPr>
+        <p:txBody>
+          <a:bodyPr vert="horz" lIns="91440" tIns="45720" rIns="91440" bIns="45720" rtlCol="0" anchor="ctr">
+            <a:normAutofit/>
+          </a:bodyPr>
+          <a:lstStyle>
+            <a:lvl1pPr algn="l" defTabSz="914400" rtl="0" eaLnBrk="1" latinLnBrk="0" hangingPunct="1">
+              <a:lnSpc>
+                <a:spcPct val="90000"/>
+              </a:lnSpc>
+              <a:spcBef>
+                <a:spcPct val="0"/>
+              </a:spcBef>
+              <a:buNone/>
+              <a:defRPr sz="4400" kern="1200">
+                <a:solidFill>
+                  <a:schemeClr val="tx1"/>
+                </a:solidFill>
+                <a:latin typeface="+mj-lt"/>
+                <a:ea typeface="+mj-ea"/>
+                <a:cs typeface="+mj-cs"/>
+              </a:defRPr>
+            </a:lvl1pPr>
+          </a:lstStyle>
+          <a:p>
+            <a:pPr algn="ctr"/>
+            <a:r>
+              <a:rPr lang="es-MX" b="1" dirty="0" smtClean="0">
+                <a:solidFill>
+                  <a:schemeClr val="bg1"/>
+                </a:solidFill>
+                <a:latin typeface="Adobe Gothic Std B" pitchFamily="34" charset="-128"/>
+                <a:ea typeface="Adobe Gothic Std B" pitchFamily="34" charset="-128"/>
+              </a:rPr>
+              <a:t>Análisis de estructura interna</a:t>
+            </a:r>
+          </a:p>
+          <a:p>
+            <a:pPr algn="ctr"/>
+            <a:endParaRPr lang="es-MX" b="1" dirty="0" smtClean="0">
+              <a:solidFill>
+                <a:schemeClr val="bg1"/>
+              </a:solidFill>
+              <a:latin typeface="Adobe Gothic Std B" pitchFamily="34" charset="-128"/>
+              <a:ea typeface="Adobe Gothic Std B" pitchFamily="34" charset="-128"/>
+            </a:endParaRPr>
+          </a:p>
+          <a:p>
+            <a:pPr algn="ctr"/>
+            <a:r>
+              <a:rPr lang="es-MX" b="1" dirty="0" smtClean="0">
+                <a:solidFill>
+                  <a:schemeClr val="bg1"/>
+                </a:solidFill>
+                <a:latin typeface="Adobe Gothic Std B" pitchFamily="34" charset="-128"/>
+                <a:ea typeface="Adobe Gothic Std B" pitchFamily="34" charset="-128"/>
+              </a:rPr>
+              <a:t>(en SPSS)</a:t>
+            </a:r>
+          </a:p>
+          <a:p>
+            <a:pPr algn="ctr"/>
+            <a:endParaRPr lang="es-MX" b="1" dirty="0">
+              <a:solidFill>
+                <a:schemeClr val="bg1"/>
+              </a:solidFill>
+              <a:latin typeface="Adobe Gothic Std B" pitchFamily="34" charset="-128"/>
+              <a:ea typeface="Adobe Gothic Std B" pitchFamily="34" charset="-128"/>
+            </a:endParaRPr>
+          </a:p>
+        </p:txBody>
+      </p:sp>
+    </p:spTree>
+    <p:extLst>
+      <p:ext uri="{BB962C8B-B14F-4D97-AF65-F5344CB8AC3E}">
+        <p14:creationId xmlns:p14="http://schemas.microsoft.com/office/powerpoint/2010/main" val="1074760785"/>
+      </p:ext>
+    </p:extLst>
+  </p:cSld>
+  <p:clrMapOvr>
+    <a:masterClrMapping/>
+  </p:clrMapOvr>
+</p:sld>
+</file>
+
 <file path=ppt/slides/slide2.xml><?xml version="1.0" encoding="utf-8"?>
 <p:sld xmlns:a="http://schemas.openxmlformats.org/drawingml/2006/main" xmlns:r="http://schemas.openxmlformats.org/officeDocument/2006/relationships" xmlns:p="http://schemas.openxmlformats.org/presentationml/2006/main">
   <p:cSld>
@@ -4343,6 +5223,883 @@
 </p:sld>
 </file>
 
+<file path=ppt/slides/slide7.xml><?xml version="1.0" encoding="utf-8"?>
+<p:sld xmlns:a="http://schemas.openxmlformats.org/drawingml/2006/main" xmlns:r="http://schemas.openxmlformats.org/officeDocument/2006/relationships" xmlns:p="http://schemas.openxmlformats.org/presentationml/2006/main">
+  <p:cSld>
+    <p:spTree>
+      <p:nvGrpSpPr>
+        <p:cNvPr id="1" name=""/>
+        <p:cNvGrpSpPr/>
+        <p:nvPr/>
+      </p:nvGrpSpPr>
+      <p:grpSpPr>
+        <a:xfrm>
+          <a:off x="0" y="0"/>
+          <a:ext cx="0" cy="0"/>
+          <a:chOff x="0" y="0"/>
+          <a:chExt cx="0" cy="0"/>
+        </a:xfrm>
+      </p:grpSpPr>
+      <p:sp>
+        <p:nvSpPr>
+          <p:cNvPr id="2" name="1 Título"/>
+          <p:cNvSpPr>
+            <a:spLocks noGrp="1"/>
+          </p:cNvSpPr>
+          <p:nvPr>
+            <p:ph type="title"/>
+          </p:nvPr>
+        </p:nvSpPr>
+        <p:spPr/>
+        <p:txBody>
+          <a:bodyPr/>
+          <a:lstStyle/>
+          <a:p>
+            <a:endParaRPr lang="es-MX"/>
+          </a:p>
+        </p:txBody>
+      </p:sp>
+      <p:sp>
+        <p:nvSpPr>
+          <p:cNvPr id="3" name="2 Marcador de contenido"/>
+          <p:cNvSpPr>
+            <a:spLocks noGrp="1"/>
+          </p:cNvSpPr>
+          <p:nvPr>
+            <p:ph idx="1"/>
+          </p:nvPr>
+        </p:nvSpPr>
+        <p:spPr/>
+        <p:txBody>
+          <a:bodyPr/>
+          <a:lstStyle/>
+          <a:p>
+            <a:endParaRPr lang="es-MX"/>
+          </a:p>
+        </p:txBody>
+      </p:sp>
+      <p:sp>
+        <p:nvSpPr>
+          <p:cNvPr id="4" name="Rectángulo 3"/>
+          <p:cNvSpPr/>
+          <p:nvPr/>
+        </p:nvSpPr>
+        <p:spPr>
+          <a:xfrm>
+            <a:off x="0" y="0"/>
+            <a:ext cx="12192000" cy="6858000"/>
+          </a:xfrm>
+          <a:prstGeom prst="rect">
+            <a:avLst/>
+          </a:prstGeom>
+          <a:solidFill>
+            <a:schemeClr val="accent5">
+              <a:lumMod val="50000"/>
+            </a:schemeClr>
+          </a:solidFill>
+          <a:ln>
+            <a:solidFill>
+              <a:schemeClr val="tx1"/>
+            </a:solidFill>
+          </a:ln>
+        </p:spPr>
+        <p:style>
+          <a:lnRef idx="2">
+            <a:schemeClr val="accent1">
+              <a:shade val="50000"/>
+            </a:schemeClr>
+          </a:lnRef>
+          <a:fillRef idx="1">
+            <a:schemeClr val="accent1"/>
+          </a:fillRef>
+          <a:effectRef idx="0">
+            <a:schemeClr val="accent1"/>
+          </a:effectRef>
+          <a:fontRef idx="minor">
+            <a:schemeClr val="lt1"/>
+          </a:fontRef>
+        </p:style>
+        <p:txBody>
+          <a:bodyPr rtlCol="0" anchor="ctr"/>
+          <a:lstStyle/>
+          <a:p>
+            <a:pPr algn="ctr"/>
+            <a:endParaRPr lang="es-MX"/>
+          </a:p>
+        </p:txBody>
+      </p:sp>
+      <p:sp>
+        <p:nvSpPr>
+          <p:cNvPr id="5" name="Título 1"/>
+          <p:cNvSpPr txBox="1">
+            <a:spLocks/>
+          </p:cNvSpPr>
+          <p:nvPr/>
+        </p:nvSpPr>
+        <p:spPr>
+          <a:xfrm>
+            <a:off x="1524000" y="1122362"/>
+            <a:ext cx="9144000" cy="3437445"/>
+          </a:xfrm>
+          <a:prstGeom prst="rect">
+            <a:avLst/>
+          </a:prstGeom>
+        </p:spPr>
+        <p:txBody>
+          <a:bodyPr vert="horz" lIns="91440" tIns="45720" rIns="91440" bIns="45720" rtlCol="0" anchor="ctr">
+            <a:normAutofit/>
+          </a:bodyPr>
+          <a:lstStyle>
+            <a:lvl1pPr algn="l" defTabSz="914400" rtl="0" eaLnBrk="1" latinLnBrk="0" hangingPunct="1">
+              <a:lnSpc>
+                <a:spcPct val="90000"/>
+              </a:lnSpc>
+              <a:spcBef>
+                <a:spcPct val="0"/>
+              </a:spcBef>
+              <a:buNone/>
+              <a:defRPr sz="4400" kern="1200">
+                <a:solidFill>
+                  <a:schemeClr val="tx1"/>
+                </a:solidFill>
+                <a:latin typeface="+mj-lt"/>
+                <a:ea typeface="+mj-ea"/>
+                <a:cs typeface="+mj-cs"/>
+              </a:defRPr>
+            </a:lvl1pPr>
+          </a:lstStyle>
+          <a:p>
+            <a:pPr algn="ctr"/>
+            <a:r>
+              <a:rPr lang="es-MX" b="1" dirty="0" smtClean="0">
+                <a:solidFill>
+                  <a:schemeClr val="bg1"/>
+                </a:solidFill>
+                <a:latin typeface="Adobe Gothic Std B" pitchFamily="34" charset="-128"/>
+                <a:ea typeface="Adobe Gothic Std B" pitchFamily="34" charset="-128"/>
+              </a:rPr>
+              <a:t>Análisis de estructura interna</a:t>
+            </a:r>
+          </a:p>
+          <a:p>
+            <a:pPr algn="ctr"/>
+            <a:endParaRPr lang="es-MX" b="1" dirty="0" smtClean="0">
+              <a:solidFill>
+                <a:schemeClr val="bg1"/>
+              </a:solidFill>
+              <a:latin typeface="Adobe Gothic Std B" pitchFamily="34" charset="-128"/>
+              <a:ea typeface="Adobe Gothic Std B" pitchFamily="34" charset="-128"/>
+            </a:endParaRPr>
+          </a:p>
+          <a:p>
+            <a:pPr algn="ctr"/>
+            <a:r>
+              <a:rPr lang="es-MX" b="1" dirty="0" smtClean="0">
+                <a:solidFill>
+                  <a:schemeClr val="bg1"/>
+                </a:solidFill>
+                <a:latin typeface="Adobe Gothic Std B" pitchFamily="34" charset="-128"/>
+                <a:ea typeface="Adobe Gothic Std B" pitchFamily="34" charset="-128"/>
+              </a:rPr>
+              <a:t>(en R)</a:t>
+            </a:r>
+          </a:p>
+          <a:p>
+            <a:pPr algn="ctr"/>
+            <a:endParaRPr lang="es-MX" b="1" dirty="0">
+              <a:solidFill>
+                <a:schemeClr val="bg1"/>
+              </a:solidFill>
+              <a:latin typeface="Adobe Gothic Std B" pitchFamily="34" charset="-128"/>
+              <a:ea typeface="Adobe Gothic Std B" pitchFamily="34" charset="-128"/>
+            </a:endParaRPr>
+          </a:p>
+        </p:txBody>
+      </p:sp>
+    </p:spTree>
+    <p:extLst>
+      <p:ext uri="{BB962C8B-B14F-4D97-AF65-F5344CB8AC3E}">
+        <p14:creationId xmlns:p14="http://schemas.microsoft.com/office/powerpoint/2010/main" val="4238565451"/>
+      </p:ext>
+    </p:extLst>
+  </p:cSld>
+  <p:clrMapOvr>
+    <a:masterClrMapping/>
+  </p:clrMapOvr>
+</p:sld>
+</file>
+
+<file path=ppt/slides/slide8.xml><?xml version="1.0" encoding="utf-8"?>
+<p:sld xmlns:a="http://schemas.openxmlformats.org/drawingml/2006/main" xmlns:r="http://schemas.openxmlformats.org/officeDocument/2006/relationships" xmlns:p="http://schemas.openxmlformats.org/presentationml/2006/main">
+  <p:cSld>
+    <p:spTree>
+      <p:nvGrpSpPr>
+        <p:cNvPr id="1" name=""/>
+        <p:cNvGrpSpPr/>
+        <p:nvPr/>
+      </p:nvGrpSpPr>
+      <p:grpSpPr>
+        <a:xfrm>
+          <a:off x="0" y="0"/>
+          <a:ext cx="0" cy="0"/>
+          <a:chOff x="0" y="0"/>
+          <a:chExt cx="0" cy="0"/>
+        </a:xfrm>
+      </p:grpSpPr>
+      <p:sp>
+        <p:nvSpPr>
+          <p:cNvPr id="2" name="1 Título"/>
+          <p:cNvSpPr>
+            <a:spLocks noGrp="1"/>
+          </p:cNvSpPr>
+          <p:nvPr>
+            <p:ph type="title"/>
+          </p:nvPr>
+        </p:nvSpPr>
+        <p:spPr/>
+        <p:txBody>
+          <a:bodyPr/>
+          <a:lstStyle/>
+          <a:p>
+            <a:endParaRPr lang="es-MX"/>
+          </a:p>
+        </p:txBody>
+      </p:sp>
+      <p:sp>
+        <p:nvSpPr>
+          <p:cNvPr id="3" name="2 Marcador de contenido"/>
+          <p:cNvSpPr>
+            <a:spLocks noGrp="1"/>
+          </p:cNvSpPr>
+          <p:nvPr>
+            <p:ph idx="1"/>
+          </p:nvPr>
+        </p:nvSpPr>
+        <p:spPr/>
+        <p:txBody>
+          <a:bodyPr/>
+          <a:lstStyle/>
+          <a:p>
+            <a:endParaRPr lang="es-MX"/>
+          </a:p>
+        </p:txBody>
+      </p:sp>
+      <p:sp>
+        <p:nvSpPr>
+          <p:cNvPr id="4" name="Rectángulo 3"/>
+          <p:cNvSpPr/>
+          <p:nvPr/>
+        </p:nvSpPr>
+        <p:spPr>
+          <a:xfrm>
+            <a:off x="0" y="0"/>
+            <a:ext cx="12192000" cy="6858000"/>
+          </a:xfrm>
+          <a:prstGeom prst="rect">
+            <a:avLst/>
+          </a:prstGeom>
+          <a:solidFill>
+            <a:schemeClr val="accent5">
+              <a:lumMod val="40000"/>
+              <a:lumOff val="60000"/>
+            </a:schemeClr>
+          </a:solidFill>
+          <a:ln>
+            <a:solidFill>
+              <a:schemeClr val="tx1"/>
+            </a:solidFill>
+          </a:ln>
+        </p:spPr>
+        <p:style>
+          <a:lnRef idx="2">
+            <a:schemeClr val="accent1">
+              <a:shade val="50000"/>
+            </a:schemeClr>
+          </a:lnRef>
+          <a:fillRef idx="1">
+            <a:schemeClr val="accent1"/>
+          </a:fillRef>
+          <a:effectRef idx="0">
+            <a:schemeClr val="accent1"/>
+          </a:effectRef>
+          <a:fontRef idx="minor">
+            <a:schemeClr val="lt1"/>
+          </a:fontRef>
+        </p:style>
+        <p:txBody>
+          <a:bodyPr rtlCol="0" anchor="ctr"/>
+          <a:lstStyle/>
+          <a:p>
+            <a:pPr algn="ctr"/>
+            <a:endParaRPr lang="es-MX"/>
+          </a:p>
+        </p:txBody>
+      </p:sp>
+      <p:sp>
+        <p:nvSpPr>
+          <p:cNvPr id="5" name="Título 1"/>
+          <p:cNvSpPr txBox="1">
+            <a:spLocks/>
+          </p:cNvSpPr>
+          <p:nvPr/>
+        </p:nvSpPr>
+        <p:spPr>
+          <a:xfrm>
+            <a:off x="298704" y="999744"/>
+            <a:ext cx="11594592" cy="5693664"/>
+          </a:xfrm>
+          <a:prstGeom prst="rect">
+            <a:avLst/>
+          </a:prstGeom>
+        </p:spPr>
+        <p:txBody>
+          <a:bodyPr vert="horz" lIns="91440" tIns="45720" rIns="91440" bIns="45720" rtlCol="0" anchor="ctr">
+            <a:normAutofit/>
+          </a:bodyPr>
+          <a:lstStyle>
+            <a:lvl1pPr algn="l" defTabSz="914400" rtl="0" eaLnBrk="1" latinLnBrk="0" hangingPunct="1">
+              <a:lnSpc>
+                <a:spcPct val="90000"/>
+              </a:lnSpc>
+              <a:spcBef>
+                <a:spcPct val="0"/>
+              </a:spcBef>
+              <a:buNone/>
+              <a:defRPr sz="4400" kern="1200">
+                <a:solidFill>
+                  <a:schemeClr val="tx1"/>
+                </a:solidFill>
+                <a:latin typeface="+mj-lt"/>
+                <a:ea typeface="+mj-ea"/>
+                <a:cs typeface="+mj-cs"/>
+              </a:defRPr>
+            </a:lvl1pPr>
+          </a:lstStyle>
+          <a:p>
+            <a:pPr marL="742950" indent="-742950">
+              <a:buAutoNum type="arabicPeriod"/>
+            </a:pPr>
+            <a:r>
+              <a:rPr lang="es-MX" b="1" dirty="0" smtClean="0">
+                <a:latin typeface="Adobe Gothic Std B" pitchFamily="34" charset="-128"/>
+                <a:ea typeface="Adobe Gothic Std B" pitchFamily="34" charset="-128"/>
+              </a:rPr>
+              <a:t>Dado que las funciones disponibles en R para implementar análisis factoriales solicitan especificar el número de factores, algunos autores recomiendan comenzar por análisis descriptivos más generales para explorar el número de factores más conveniente, </a:t>
+            </a:r>
+            <a:r>
+              <a:rPr lang="es-MX" b="1" dirty="0" err="1" smtClean="0">
+                <a:latin typeface="Adobe Gothic Std B" pitchFamily="34" charset="-128"/>
+                <a:ea typeface="Adobe Gothic Std B" pitchFamily="34" charset="-128"/>
+              </a:rPr>
+              <a:t>such</a:t>
+            </a:r>
+            <a:r>
+              <a:rPr lang="es-MX" b="1" dirty="0" smtClean="0">
+                <a:latin typeface="Adobe Gothic Std B" pitchFamily="34" charset="-128"/>
+                <a:ea typeface="Adobe Gothic Std B" pitchFamily="34" charset="-128"/>
+              </a:rPr>
+              <a:t> as:</a:t>
+            </a:r>
+          </a:p>
+          <a:p>
+            <a:pPr marL="1200150" lvl="1" indent="-742950">
+              <a:buAutoNum type="arabicPeriod"/>
+            </a:pPr>
+            <a:endParaRPr lang="es-MX" b="1" dirty="0">
+              <a:latin typeface="Adobe Gothic Std B" pitchFamily="34" charset="-128"/>
+              <a:ea typeface="Adobe Gothic Std B" pitchFamily="34" charset="-128"/>
+            </a:endParaRPr>
+          </a:p>
+          <a:p>
+            <a:pPr marL="1200150" lvl="1" indent="-742950">
+              <a:buAutoNum type="arabicPeriod"/>
+            </a:pPr>
+            <a:r>
+              <a:rPr lang="es-MX" b="1" dirty="0" smtClean="0">
+                <a:latin typeface="Adobe Gothic Std B" pitchFamily="34" charset="-128"/>
+                <a:ea typeface="Adobe Gothic Std B" pitchFamily="34" charset="-128"/>
+              </a:rPr>
+              <a:t>Análisis de Componentes Principales (PCA)</a:t>
+            </a:r>
+          </a:p>
+          <a:p>
+            <a:pPr marL="1200150" lvl="1" indent="-742950">
+              <a:buAutoNum type="arabicPeriod"/>
+            </a:pPr>
+            <a:r>
+              <a:rPr lang="es-MX" b="1" dirty="0" smtClean="0">
+                <a:latin typeface="Adobe Gothic Std B" pitchFamily="34" charset="-128"/>
+                <a:ea typeface="Adobe Gothic Std B" pitchFamily="34" charset="-128"/>
+              </a:rPr>
+              <a:t>Análisis Paralelo (PA)</a:t>
+            </a:r>
+          </a:p>
+          <a:p>
+            <a:pPr marL="1200150" lvl="1" indent="-742950">
+              <a:buAutoNum type="arabicPeriod"/>
+            </a:pPr>
+            <a:r>
+              <a:rPr lang="es-MX" b="1" dirty="0" smtClean="0">
+                <a:latin typeface="Adobe Gothic Std B" pitchFamily="34" charset="-128"/>
+                <a:ea typeface="Adobe Gothic Std B" pitchFamily="34" charset="-128"/>
+              </a:rPr>
+              <a:t>VSS (</a:t>
+            </a:r>
+            <a:r>
+              <a:rPr lang="es-MX" b="1" dirty="0" err="1" smtClean="0">
+                <a:latin typeface="Adobe Gothic Std B" pitchFamily="34" charset="-128"/>
+                <a:ea typeface="Adobe Gothic Std B" pitchFamily="34" charset="-128"/>
+              </a:rPr>
+              <a:t>Very</a:t>
+            </a:r>
+            <a:r>
+              <a:rPr lang="es-MX" b="1" dirty="0" smtClean="0">
+                <a:latin typeface="Adobe Gothic Std B" pitchFamily="34" charset="-128"/>
+                <a:ea typeface="Adobe Gothic Std B" pitchFamily="34" charset="-128"/>
+              </a:rPr>
+              <a:t> Simple </a:t>
+            </a:r>
+            <a:r>
+              <a:rPr lang="es-MX" b="1" dirty="0" err="1" smtClean="0">
+                <a:latin typeface="Adobe Gothic Std B" pitchFamily="34" charset="-128"/>
+                <a:ea typeface="Adobe Gothic Std B" pitchFamily="34" charset="-128"/>
+              </a:rPr>
+              <a:t>Structure</a:t>
+            </a:r>
+            <a:endParaRPr lang="es-MX" b="1" dirty="0" smtClean="0">
+              <a:latin typeface="Adobe Gothic Std B" pitchFamily="34" charset="-128"/>
+              <a:ea typeface="Adobe Gothic Std B" pitchFamily="34" charset="-128"/>
+            </a:endParaRPr>
+          </a:p>
+          <a:p>
+            <a:pPr marL="1200150" lvl="1" indent="-742950">
+              <a:buAutoNum type="arabicPeriod"/>
+            </a:pPr>
+            <a:endParaRPr lang="es-MX" b="1" dirty="0" smtClean="0">
+              <a:solidFill>
+                <a:schemeClr val="bg1"/>
+              </a:solidFill>
+              <a:latin typeface="Adobe Gothic Std B" pitchFamily="34" charset="-128"/>
+              <a:ea typeface="Adobe Gothic Std B" pitchFamily="34" charset="-128"/>
+            </a:endParaRPr>
+          </a:p>
+          <a:p>
+            <a:pPr marL="742950" indent="-742950">
+              <a:buAutoNum type="arabicPeriod"/>
+            </a:pPr>
+            <a:endParaRPr lang="es-MX" b="1" dirty="0" smtClean="0">
+              <a:solidFill>
+                <a:schemeClr val="bg1"/>
+              </a:solidFill>
+              <a:latin typeface="Adobe Gothic Std B" pitchFamily="34" charset="-128"/>
+              <a:ea typeface="Adobe Gothic Std B" pitchFamily="34" charset="-128"/>
+            </a:endParaRPr>
+          </a:p>
+          <a:p>
+            <a:pPr algn="ctr"/>
+            <a:endParaRPr lang="es-MX" b="1" dirty="0">
+              <a:solidFill>
+                <a:schemeClr val="bg1"/>
+              </a:solidFill>
+              <a:latin typeface="Adobe Gothic Std B" pitchFamily="34" charset="-128"/>
+              <a:ea typeface="Adobe Gothic Std B" pitchFamily="34" charset="-128"/>
+            </a:endParaRPr>
+          </a:p>
+        </p:txBody>
+      </p:sp>
+    </p:spTree>
+    <p:extLst>
+      <p:ext uri="{BB962C8B-B14F-4D97-AF65-F5344CB8AC3E}">
+        <p14:creationId xmlns:p14="http://schemas.microsoft.com/office/powerpoint/2010/main" val="1163442750"/>
+      </p:ext>
+    </p:extLst>
+  </p:cSld>
+  <p:clrMapOvr>
+    <a:masterClrMapping/>
+  </p:clrMapOvr>
+</p:sld>
+</file>
+
+<file path=ppt/slides/slide9.xml><?xml version="1.0" encoding="utf-8"?>
+<p:sld xmlns:a="http://schemas.openxmlformats.org/drawingml/2006/main" xmlns:r="http://schemas.openxmlformats.org/officeDocument/2006/relationships" xmlns:p="http://schemas.openxmlformats.org/presentationml/2006/main">
+  <p:cSld>
+    <p:spTree>
+      <p:nvGrpSpPr>
+        <p:cNvPr id="1" name=""/>
+        <p:cNvGrpSpPr/>
+        <p:nvPr/>
+      </p:nvGrpSpPr>
+      <p:grpSpPr>
+        <a:xfrm>
+          <a:off x="0" y="0"/>
+          <a:ext cx="0" cy="0"/>
+          <a:chOff x="0" y="0"/>
+          <a:chExt cx="0" cy="0"/>
+        </a:xfrm>
+      </p:grpSpPr>
+      <p:pic>
+        <p:nvPicPr>
+          <p:cNvPr id="2050" name="Picture 2"/>
+          <p:cNvPicPr>
+            <a:picLocks noChangeAspect="1" noChangeArrowheads="1"/>
+          </p:cNvPicPr>
+          <p:nvPr/>
+        </p:nvPicPr>
+        <p:blipFill>
+          <a:blip r:embed="rId2">
+            <a:extLst>
+              <a:ext uri="{28A0092B-C50C-407E-A947-70E740481C1C}">
+                <a14:useLocalDpi xmlns:a14="http://schemas.microsoft.com/office/drawing/2010/main" val="0"/>
+              </a:ext>
+            </a:extLst>
+          </a:blip>
+          <a:srcRect/>
+          <a:stretch>
+            <a:fillRect/>
+          </a:stretch>
+        </p:blipFill>
+        <p:spPr bwMode="auto">
+          <a:xfrm>
+            <a:off x="3686479" y="68896"/>
+            <a:ext cx="8505521" cy="6606540"/>
+          </a:xfrm>
+          <a:prstGeom prst="rect">
+            <a:avLst/>
+          </a:prstGeom>
+          <a:noFill/>
+          <a:ln>
+            <a:noFill/>
+          </a:ln>
+          <a:effectLst/>
+          <a:extLst>
+            <a:ext uri="{909E8E84-426E-40DD-AFC4-6F175D3DCCD1}">
+              <a14:hiddenFill xmlns:a14="http://schemas.microsoft.com/office/drawing/2010/main">
+                <a:solidFill>
+                  <a:schemeClr val="accent1"/>
+                </a:solidFill>
+              </a14:hiddenFill>
+            </a:ext>
+            <a:ext uri="{91240B29-F687-4F45-9708-019B960494DF}">
+              <a14:hiddenLine xmlns:a14="http://schemas.microsoft.com/office/drawing/2010/main" w="9525">
+                <a:solidFill>
+                  <a:schemeClr val="tx1"/>
+                </a:solidFill>
+                <a:miter lim="800000"/>
+                <a:headEnd/>
+                <a:tailEnd/>
+              </a14:hiddenLine>
+            </a:ext>
+            <a:ext uri="{AF507438-7753-43E0-B8FC-AC1667EBCBE1}">
+              <a14:hiddenEffects xmlns:a14="http://schemas.microsoft.com/office/drawing/2010/main">
+                <a:effectLst>
+                  <a:outerShdw dist="35921" dir="2700000" algn="ctr" rotWithShape="0">
+                    <a:schemeClr val="bg2"/>
+                  </a:outerShdw>
+                </a:effectLst>
+              </a14:hiddenEffects>
+            </a:ext>
+          </a:extLst>
+        </p:spPr>
+      </p:pic>
+      <p:sp>
+        <p:nvSpPr>
+          <p:cNvPr id="2" name="1 Título"/>
+          <p:cNvSpPr>
+            <a:spLocks noGrp="1"/>
+          </p:cNvSpPr>
+          <p:nvPr>
+            <p:ph type="title"/>
+          </p:nvPr>
+        </p:nvSpPr>
+        <p:spPr/>
+        <p:txBody>
+          <a:bodyPr/>
+          <a:lstStyle/>
+          <a:p>
+            <a:endParaRPr lang="es-MX"/>
+          </a:p>
+        </p:txBody>
+      </p:sp>
+      <p:sp>
+        <p:nvSpPr>
+          <p:cNvPr id="3" name="2 Marcador de contenido"/>
+          <p:cNvSpPr>
+            <a:spLocks noGrp="1"/>
+          </p:cNvSpPr>
+          <p:nvPr>
+            <p:ph idx="1"/>
+          </p:nvPr>
+        </p:nvSpPr>
+        <p:spPr/>
+        <p:txBody>
+          <a:bodyPr/>
+          <a:lstStyle/>
+          <a:p>
+            <a:endParaRPr lang="es-MX"/>
+          </a:p>
+        </p:txBody>
+      </p:sp>
+      <p:sp>
+        <p:nvSpPr>
+          <p:cNvPr id="4" name="Rectángulo 5"/>
+          <p:cNvSpPr/>
+          <p:nvPr/>
+        </p:nvSpPr>
+        <p:spPr>
+          <a:xfrm>
+            <a:off x="0" y="0"/>
+            <a:ext cx="12192000" cy="365125"/>
+          </a:xfrm>
+          <a:prstGeom prst="rect">
+            <a:avLst/>
+          </a:prstGeom>
+          <a:solidFill>
+            <a:schemeClr val="accent5">
+              <a:lumMod val="40000"/>
+              <a:lumOff val="60000"/>
+            </a:schemeClr>
+          </a:solidFill>
+        </p:spPr>
+        <p:style>
+          <a:lnRef idx="2">
+            <a:schemeClr val="accent1">
+              <a:shade val="50000"/>
+            </a:schemeClr>
+          </a:lnRef>
+          <a:fillRef idx="1">
+            <a:schemeClr val="accent1"/>
+          </a:fillRef>
+          <a:effectRef idx="0">
+            <a:schemeClr val="accent1"/>
+          </a:effectRef>
+          <a:fontRef idx="minor">
+            <a:schemeClr val="lt1"/>
+          </a:fontRef>
+        </p:style>
+        <p:txBody>
+          <a:bodyPr rtlCol="0" anchor="ctr"/>
+          <a:lstStyle/>
+          <a:p>
+            <a:pPr algn="ctr"/>
+            <a:endParaRPr lang="es-MX"/>
+          </a:p>
+        </p:txBody>
+      </p:sp>
+      <p:sp>
+        <p:nvSpPr>
+          <p:cNvPr id="5" name="Rectángulo 6"/>
+          <p:cNvSpPr/>
+          <p:nvPr/>
+        </p:nvSpPr>
+        <p:spPr>
+          <a:xfrm>
+            <a:off x="0" y="6492875"/>
+            <a:ext cx="12192000" cy="365125"/>
+          </a:xfrm>
+          <a:prstGeom prst="rect">
+            <a:avLst/>
+          </a:prstGeom>
+          <a:solidFill>
+            <a:schemeClr val="accent6">
+              <a:lumMod val="75000"/>
+            </a:schemeClr>
+          </a:solidFill>
+        </p:spPr>
+        <p:style>
+          <a:lnRef idx="2">
+            <a:schemeClr val="accent1">
+              <a:shade val="50000"/>
+            </a:schemeClr>
+          </a:lnRef>
+          <a:fillRef idx="1">
+            <a:schemeClr val="accent1"/>
+          </a:fillRef>
+          <a:effectRef idx="0">
+            <a:schemeClr val="accent1"/>
+          </a:effectRef>
+          <a:fontRef idx="minor">
+            <a:schemeClr val="lt1"/>
+          </a:fontRef>
+        </p:style>
+        <p:txBody>
+          <a:bodyPr rtlCol="0" anchor="ctr"/>
+          <a:lstStyle/>
+          <a:p>
+            <a:pPr algn="ctr"/>
+            <a:endParaRPr lang="es-MX"/>
+          </a:p>
+        </p:txBody>
+      </p:sp>
+      <p:sp>
+        <p:nvSpPr>
+          <p:cNvPr id="7" name="Rectángulo 5"/>
+          <p:cNvSpPr/>
+          <p:nvPr/>
+        </p:nvSpPr>
+        <p:spPr>
+          <a:xfrm>
+            <a:off x="0" y="-1"/>
+            <a:ext cx="12192000" cy="365125"/>
+          </a:xfrm>
+          <a:prstGeom prst="rect">
+            <a:avLst/>
+          </a:prstGeom>
+          <a:solidFill>
+            <a:schemeClr val="accent5">
+              <a:lumMod val="40000"/>
+              <a:lumOff val="60000"/>
+            </a:schemeClr>
+          </a:solidFill>
+          <a:ln>
+            <a:solidFill>
+              <a:schemeClr val="accent1"/>
+            </a:solidFill>
+          </a:ln>
+        </p:spPr>
+        <p:style>
+          <a:lnRef idx="2">
+            <a:schemeClr val="accent1">
+              <a:shade val="50000"/>
+            </a:schemeClr>
+          </a:lnRef>
+          <a:fillRef idx="1">
+            <a:schemeClr val="accent1"/>
+          </a:fillRef>
+          <a:effectRef idx="0">
+            <a:schemeClr val="accent1"/>
+          </a:effectRef>
+          <a:fontRef idx="minor">
+            <a:schemeClr val="lt1"/>
+          </a:fontRef>
+        </p:style>
+        <p:txBody>
+          <a:bodyPr rtlCol="0" anchor="ctr"/>
+          <a:lstStyle/>
+          <a:p>
+            <a:pPr algn="ctr"/>
+            <a:endParaRPr lang="es-MX"/>
+          </a:p>
+        </p:txBody>
+      </p:sp>
+      <p:sp>
+        <p:nvSpPr>
+          <p:cNvPr id="8" name="Rectángulo 6"/>
+          <p:cNvSpPr/>
+          <p:nvPr/>
+        </p:nvSpPr>
+        <p:spPr>
+          <a:xfrm>
+            <a:off x="0" y="6492874"/>
+            <a:ext cx="12192000" cy="365125"/>
+          </a:xfrm>
+          <a:prstGeom prst="rect">
+            <a:avLst/>
+          </a:prstGeom>
+          <a:solidFill>
+            <a:schemeClr val="accent5">
+              <a:lumMod val="40000"/>
+              <a:lumOff val="60000"/>
+            </a:schemeClr>
+          </a:solidFill>
+          <a:ln>
+            <a:solidFill>
+              <a:schemeClr val="accent1"/>
+            </a:solidFill>
+          </a:ln>
+        </p:spPr>
+        <p:style>
+          <a:lnRef idx="2">
+            <a:schemeClr val="accent1">
+              <a:shade val="50000"/>
+            </a:schemeClr>
+          </a:lnRef>
+          <a:fillRef idx="1">
+            <a:schemeClr val="accent1"/>
+          </a:fillRef>
+          <a:effectRef idx="0">
+            <a:schemeClr val="accent1"/>
+          </a:effectRef>
+          <a:fontRef idx="minor">
+            <a:schemeClr val="lt1"/>
+          </a:fontRef>
+        </p:style>
+        <p:txBody>
+          <a:bodyPr rtlCol="0" anchor="ctr"/>
+          <a:lstStyle/>
+          <a:p>
+            <a:pPr algn="ctr"/>
+            <a:endParaRPr lang="es-MX"/>
+          </a:p>
+        </p:txBody>
+      </p:sp>
+      <p:sp>
+        <p:nvSpPr>
+          <p:cNvPr id="9" name="Rectángulo 3"/>
+          <p:cNvSpPr/>
+          <p:nvPr/>
+        </p:nvSpPr>
+        <p:spPr>
+          <a:xfrm>
+            <a:off x="8900160" y="0"/>
+            <a:ext cx="3291840" cy="963168"/>
+          </a:xfrm>
+          <a:prstGeom prst="rect">
+            <a:avLst/>
+          </a:prstGeom>
+          <a:solidFill>
+            <a:schemeClr val="accent5">
+              <a:lumMod val="40000"/>
+              <a:lumOff val="60000"/>
+            </a:schemeClr>
+          </a:solidFill>
+          <a:ln>
+            <a:solidFill>
+              <a:schemeClr val="tx1"/>
+            </a:solidFill>
+          </a:ln>
+        </p:spPr>
+        <p:style>
+          <a:lnRef idx="2">
+            <a:schemeClr val="accent1">
+              <a:shade val="50000"/>
+            </a:schemeClr>
+          </a:lnRef>
+          <a:fillRef idx="1">
+            <a:schemeClr val="accent1"/>
+          </a:fillRef>
+          <a:effectRef idx="0">
+            <a:schemeClr val="accent1"/>
+          </a:effectRef>
+          <a:fontRef idx="minor">
+            <a:schemeClr val="lt1"/>
+          </a:fontRef>
+        </p:style>
+        <p:txBody>
+          <a:bodyPr rtlCol="0" anchor="ctr"/>
+          <a:lstStyle/>
+          <a:p>
+            <a:pPr algn="ctr"/>
+            <a:r>
+              <a:rPr lang="es-MX" sz="5000" b="1" dirty="0" smtClean="0"/>
+              <a:t>PCA</a:t>
+            </a:r>
+            <a:endParaRPr lang="es-MX" sz="5000" b="1" dirty="0"/>
+          </a:p>
+        </p:txBody>
+      </p:sp>
+    </p:spTree>
+    <p:extLst>
+      <p:ext uri="{BB962C8B-B14F-4D97-AF65-F5344CB8AC3E}">
+        <p14:creationId xmlns:p14="http://schemas.microsoft.com/office/powerpoint/2010/main" val="1569702266"/>
+      </p:ext>
+    </p:extLst>
+  </p:cSld>
+  <p:clrMapOvr>
+    <a:masterClrMapping/>
+  </p:clrMapOvr>
+</p:sld>
+</file>
+
 <file path=ppt/theme/theme1.xml><?xml version="1.0" encoding="utf-8"?>
 <a:theme xmlns:a="http://schemas.openxmlformats.org/drawingml/2006/main" name="Tema de Office">
   <a:themeElements>
@@ -4386,7 +6143,7 @@
     </a:clrScheme>
     <a:fontScheme name="Office">
       <a:majorFont>
-        <a:latin typeface="Calibri Light" panose="020F0302020204030204"/>
+        <a:latin typeface="Calibri Light"/>
         <a:ea typeface=""/>
         <a:cs typeface=""/>
         <a:font script="Jpan" typeface="ＭＳ Ｐゴシック"/>
@@ -4421,7 +6178,7 @@
         <a:font script="Geor" typeface="Sylfaen"/>
       </a:majorFont>
       <a:minorFont>
-        <a:latin typeface="Calibri" panose="020F0502020204030204"/>
+        <a:latin typeface="Calibri"/>
         <a:ea typeface=""/>
         <a:cs typeface=""/>
         <a:font script="Jpan" typeface="ＭＳ Ｐゴシック"/>
@@ -4598,7 +6355,7 @@
   <a:extraClrSchemeLst/>
   <a:extLst>
     <a:ext uri="{05A4C25C-085E-4340-85A3-A5531E510DB2}">
-      <thm15:themeFamily xmlns:thm15="http://schemas.microsoft.com/office/thememl/2012/main" name="Office Theme" id="{62F939B6-93AF-4DB8-9C6B-D6C7DFDC589F}" vid="{4A3C46E8-61CC-4603-A589-7422A47A8E4A}"/>
+      <thm15:themeFamily xmlns:thm15="http://schemas.microsoft.com/office/thememl/2012/main" xmlns="" name="Office Theme" id="{62F939B6-93AF-4DB8-9C6B-D6C7DFDC589F}" vid="{4A3C46E8-61CC-4603-A589-7422A47A8E4A}"/>
     </a:ext>
   </a:extLst>
 </a:theme>

</xml_diff>